<commit_message>
adding missing installers, adding minor changes into the presentations
</commit_message>
<xml_diff>
--- a/Whiteboard design session/WDS trainer presentation - App modernization.pptx
+++ b/Whiteboard design session/WDS trainer presentation - App modernization.pptx
@@ -226,7 +226,7 @@
           <a:p>
             <a:fld id="{52A13B17-C506-4D51-BB37-16B365906619}" type="datetimeFigureOut">
               <a:rPr lang="en-US" smtClean="0"/>
-              <a:t>3/29/2022</a:t>
+              <a:t>6/12/2022</a:t>
             </a:fld>
             <a:endParaRPr lang="en-US" dirty="0"/>
           </a:p>
@@ -2989,7 +2989,7 @@
                   <a:prstClr val="black"/>
                 </a:solidFill>
               </a:rPr>
-              <a:t>3/29/2022 12:22 PM</a:t>
+              <a:t>6/12/2022 3:11 PM</a:t>
             </a:fld>
             <a:endParaRPr lang="en-US" dirty="0">
               <a:solidFill>
@@ -15913,12 +15913,6 @@
           <a:p>
             <a:r>
               <a:rPr lang="en-US" sz="2000" dirty="0"/>
-              <a:t>Solution architect</a:t>
-            </a:r>
-          </a:p>
-          <a:p>
-            <a:r>
-              <a:rPr lang="en-US" sz="2000" dirty="0"/>
               <a:t>S&amp;T Consulting Hungary </a:t>
             </a:r>
             <a:r>
@@ -17272,7 +17266,7 @@
 </file>
 
 <file path=ppt/slides/slide19.xml><?xml version="1.0" encoding="utf-8"?>
-<p:sld xmlns:a="http://schemas.openxmlformats.org/drawingml/2006/main" xmlns:r="http://schemas.openxmlformats.org/officeDocument/2006/relationships" xmlns:p="http://schemas.openxmlformats.org/presentationml/2006/main">
+<p:sld xmlns:a="http://schemas.openxmlformats.org/drawingml/2006/main" xmlns:r="http://schemas.openxmlformats.org/officeDocument/2006/relationships" xmlns:p="http://schemas.openxmlformats.org/presentationml/2006/main" show="0">
   <p:cSld>
     <p:spTree>
       <p:nvGrpSpPr>
@@ -17429,11 +17423,11 @@
   <p:clrMapOvr>
     <a:masterClrMapping/>
   </p:clrMapOvr>
-  <mc:AlternateContent xmlns:mc="http://schemas.openxmlformats.org/markup-compatibility/2006" xmlns:p14="http://schemas.microsoft.com/office/powerpoint/2010/main">
-    <mc:Choice Requires="p14">
+  <mc:AlternateContent xmlns:mc="http://schemas.openxmlformats.org/markup-compatibility/2006">
+    <mc:Choice xmlns:p14="http://schemas.microsoft.com/office/powerpoint/2010/main" Requires="p14">
       <p:transition p14:dur="0"/>
     </mc:Choice>
-    <mc:Fallback xmlns="">
+    <mc:Fallback>
       <p:transition/>
     </mc:Fallback>
   </mc:AlternateContent>
@@ -17525,7 +17519,15 @@
           <a:p>
             <a:r>
               <a:rPr lang="en-US" sz="2800" dirty="0"/>
-              <a:t>In this whiteboard design session, you work with a group to analyze and design a solution for moving legacy on-premises applications and infrastructure to cloud services. As part of the modernization effort, you will discuss modern concepts such as Serverless.</a:t>
+              <a:t>In this whiteboard design session, you work with a group to </a:t>
+            </a:r>
+            <a:r>
+              <a:rPr lang="en-US" sz="2800" b="1" dirty="0"/>
+              <a:t>analyze and design a solution for moving legacy on-premises applications and infrastructure to cloud services</a:t>
+            </a:r>
+            <a:r>
+              <a:rPr lang="en-US" sz="2800" dirty="0"/>
+              <a:t>. As part of the modernization effort, you will discuss modern concepts such as Serverless.</a:t>
             </a:r>
           </a:p>
           <a:p>
@@ -18372,7 +18374,7 @@
                 </a:solidFill>
                 <a:cs typeface="Segoe UI" panose="020B0502040204020203" pitchFamily="34" charset="0"/>
               </a:rPr>
-              <a:t>Customer situation - 2</a:t>
+              <a:t>Customer situation </a:t>
             </a:r>
             <a:br>
               <a:rPr lang="en-US" dirty="0">
@@ -18425,7 +18427,7 @@
                 </a:solidFill>
                 <a:latin typeface="+mj-lt"/>
               </a:rPr>
-              <a:t>A Windows Server 2019 hosting the web commerce</a:t>
+              <a:t>A Windows Server 2019 hosting the web commerce application</a:t>
             </a:r>
           </a:p>
           <a:p>
@@ -18441,7 +18443,7 @@
                 </a:solidFill>
                 <a:latin typeface="+mj-lt"/>
               </a:rPr>
-              <a:t>A SQL Server 2008 R2 hosting the website.</a:t>
+              <a:t>A SQL Server 2008 R2 hosting the website data</a:t>
             </a:r>
           </a:p>
           <a:p>
@@ -18456,7 +18458,7 @@
                   <a:schemeClr val="tx1"/>
                 </a:solidFill>
               </a:rPr>
-              <a:t>On-premises servers maintained by a hardware technician and a system administrator.</a:t>
+              <a:t>On-premises servers maintained by a hardware technician and a system administrator</a:t>
             </a:r>
             <a:endParaRPr lang="en-US" sz="2800" dirty="0">
               <a:solidFill>
@@ -18477,7 +18479,7 @@
                   <a:schemeClr val="tx1"/>
                 </a:solidFill>
               </a:rPr>
-              <a:t>Out of business software vendor.</a:t>
+              <a:t>Out of business software vendor</a:t>
             </a:r>
           </a:p>
           <a:p>
@@ -18501,7 +18503,7 @@
                   <a:schemeClr val="tx1"/>
                 </a:solidFill>
               </a:rPr>
-              <a:t>neers.</a:t>
+              <a:t>neers</a:t>
             </a:r>
           </a:p>
           <a:p>
@@ -18709,7 +18711,7 @@
                 <a:latin typeface="Segoe UI Semilight" panose="020B0402040204020203" pitchFamily="34" charset="0"/>
                 <a:cs typeface="Segoe UI Semilight" panose="020B0402040204020203" pitchFamily="34" charset="0"/>
               </a:rPr>
-              <a:t>DevOps Introduction</a:t>
+              <a:t>DevOps introduction</a:t>
             </a:r>
           </a:p>
           <a:p>

</xml_diff>